<commit_message>
removed unnecessary directories and files
</commit_message>
<xml_diff>
--- a/Documentation/TPJ_FINAL_PPT.pptx
+++ b/Documentation/TPJ_FINAL_PPT.pptx
@@ -2,7 +2,7 @@
 <file path=ppt/presentation.xml><?xml version="1.0" encoding="utf-8"?>
 <p:presentation xmlns:a="http://schemas.openxmlformats.org/drawingml/2006/main" xmlns:r="http://schemas.openxmlformats.org/officeDocument/2006/relationships" xmlns:p="http://schemas.openxmlformats.org/presentationml/2006/main" saveSubsetFonts="1">
   <p:sldMasterIdLst>
-    <p:sldMasterId id="2147483660" r:id="rId1"/>
+    <p:sldMasterId id="2147483675" r:id="rId1"/>
   </p:sldMasterIdLst>
   <p:notesMasterIdLst>
     <p:notesMasterId r:id="rId13"/>
@@ -13,7 +13,7 @@
     <p:sldId id="258" r:id="rId4"/>
     <p:sldId id="259" r:id="rId5"/>
     <p:sldId id="260" r:id="rId6"/>
-    <p:sldId id="266" r:id="rId7"/>
+    <p:sldId id="271" r:id="rId7"/>
     <p:sldId id="261" r:id="rId8"/>
     <p:sldId id="268" r:id="rId9"/>
     <p:sldId id="269" r:id="rId10"/>
@@ -2157,7 +2157,7 @@
   <dgm:whole/>
   <dgm:extLst>
     <a:ext uri="http://schemas.microsoft.com/office/drawing/2008/diagram">
-      <dsp:dataModelExt xmlns:dsp="http://schemas.microsoft.com/office/drawing/2008/diagram" relId="rId6" minVer="http://schemas.openxmlformats.org/drawingml/2006/diagram"/>
+      <dsp:dataModelExt xmlns:dsp="http://schemas.microsoft.com/office/drawing/2008/diagram" relId="rId7" minVer="http://schemas.openxmlformats.org/drawingml/2006/diagram"/>
     </a:ext>
   </dgm:extLst>
 </dgm:dataModel>
@@ -2351,7 +2351,7 @@
   <dgm:whole/>
   <dgm:extLst>
     <a:ext uri="http://schemas.microsoft.com/office/drawing/2008/diagram">
-      <dsp:dataModelExt xmlns:dsp="http://schemas.microsoft.com/office/drawing/2008/diagram" relId="rId6" minVer="http://schemas.openxmlformats.org/drawingml/2006/diagram"/>
+      <dsp:dataModelExt xmlns:dsp="http://schemas.microsoft.com/office/drawing/2008/diagram" relId="rId7" minVer="http://schemas.openxmlformats.org/drawingml/2006/diagram"/>
     </a:ext>
   </dgm:extLst>
 </dgm:dataModel>
@@ -6376,7 +6376,7 @@
           <a:p>
             <a:r>
               <a:rPr lang="en-US" dirty="0"/>
-              <a:t>Update this</a:t>
+              <a:t>Both of us</a:t>
             </a:r>
           </a:p>
         </p:txBody>
@@ -6398,7 +6398,7 @@
           <a:p>
             <a:fld id="{93298189-A7EB-4F19-9FED-0CE3B0A96051}" type="slidenum">
               <a:rPr lang="en-US" smtClean="0"/>
-              <a:t>5</a:t>
+              <a:t>1</a:t>
             </a:fld>
             <a:endParaRPr lang="en-US"/>
           </a:p>
@@ -6407,7 +6407,182 @@
     </p:spTree>
     <p:extLst>
       <p:ext uri="{BB962C8B-B14F-4D97-AF65-F5344CB8AC3E}">
-        <p14:creationId xmlns:p14="http://schemas.microsoft.com/office/powerpoint/2010/main" val="1415195951"/>
+        <p14:creationId xmlns:p14="http://schemas.microsoft.com/office/powerpoint/2010/main" val="441929949"/>
+      </p:ext>
+    </p:extLst>
+  </p:cSld>
+  <p:clrMapOvr>
+    <a:masterClrMapping/>
+  </p:clrMapOvr>
+</p:notes>
+</file>
+
+<file path=ppt/notesSlides/notesSlide10.xml><?xml version="1.0" encoding="utf-8"?>
+<p:notes xmlns:a="http://schemas.openxmlformats.org/drawingml/2006/main" xmlns:r="http://schemas.openxmlformats.org/officeDocument/2006/relationships" xmlns:p="http://schemas.openxmlformats.org/presentationml/2006/main">
+  <p:cSld>
+    <p:spTree>
+      <p:nvGrpSpPr>
+        <p:cNvPr id="1" name=""/>
+        <p:cNvGrpSpPr/>
+        <p:nvPr/>
+      </p:nvGrpSpPr>
+      <p:grpSpPr>
+        <a:xfrm>
+          <a:off x="0" y="0"/>
+          <a:ext cx="0" cy="0"/>
+          <a:chOff x="0" y="0"/>
+          <a:chExt cx="0" cy="0"/>
+        </a:xfrm>
+      </p:grpSpPr>
+      <p:sp>
+        <p:nvSpPr>
+          <p:cNvPr id="2" name="Slide Image Placeholder 1"/>
+          <p:cNvSpPr>
+            <a:spLocks noGrp="1" noRot="1" noChangeAspect="1"/>
+          </p:cNvSpPr>
+          <p:nvPr>
+            <p:ph type="sldImg"/>
+          </p:nvPr>
+        </p:nvSpPr>
+        <p:spPr/>
+      </p:sp>
+      <p:sp>
+        <p:nvSpPr>
+          <p:cNvPr id="3" name="Notes Placeholder 2"/>
+          <p:cNvSpPr>
+            <a:spLocks noGrp="1"/>
+          </p:cNvSpPr>
+          <p:nvPr>
+            <p:ph type="body" idx="1"/>
+          </p:nvPr>
+        </p:nvSpPr>
+        <p:spPr/>
+        <p:txBody>
+          <a:bodyPr/>
+          <a:lstStyle/>
+          <a:p>
+            <a:r>
+              <a:rPr lang="en-US" dirty="0"/>
+              <a:t>pat</a:t>
+            </a:r>
+          </a:p>
+        </p:txBody>
+      </p:sp>
+      <p:sp>
+        <p:nvSpPr>
+          <p:cNvPr id="4" name="Slide Number Placeholder 3"/>
+          <p:cNvSpPr>
+            <a:spLocks noGrp="1"/>
+          </p:cNvSpPr>
+          <p:nvPr>
+            <p:ph type="sldNum" sz="quarter" idx="5"/>
+          </p:nvPr>
+        </p:nvSpPr>
+        <p:spPr/>
+        <p:txBody>
+          <a:bodyPr/>
+          <a:lstStyle/>
+          <a:p>
+            <a:fld id="{93298189-A7EB-4F19-9FED-0CE3B0A96051}" type="slidenum">
+              <a:rPr lang="en-US" smtClean="0"/>
+              <a:t>10</a:t>
+            </a:fld>
+            <a:endParaRPr lang="en-US"/>
+          </a:p>
+        </p:txBody>
+      </p:sp>
+    </p:spTree>
+    <p:extLst>
+      <p:ext uri="{BB962C8B-B14F-4D97-AF65-F5344CB8AC3E}">
+        <p14:creationId xmlns:p14="http://schemas.microsoft.com/office/powerpoint/2010/main" val="1915405856"/>
+      </p:ext>
+    </p:extLst>
+  </p:cSld>
+  <p:clrMapOvr>
+    <a:masterClrMapping/>
+  </p:clrMapOvr>
+</p:notes>
+</file>
+
+<file path=ppt/notesSlides/notesSlide11.xml><?xml version="1.0" encoding="utf-8"?>
+<p:notes xmlns:a="http://schemas.openxmlformats.org/drawingml/2006/main" xmlns:r="http://schemas.openxmlformats.org/officeDocument/2006/relationships" xmlns:p="http://schemas.openxmlformats.org/presentationml/2006/main">
+  <p:cSld>
+    <p:spTree>
+      <p:nvGrpSpPr>
+        <p:cNvPr id="1" name=""/>
+        <p:cNvGrpSpPr/>
+        <p:nvPr/>
+      </p:nvGrpSpPr>
+      <p:grpSpPr>
+        <a:xfrm>
+          <a:off x="0" y="0"/>
+          <a:ext cx="0" cy="0"/>
+          <a:chOff x="0" y="0"/>
+          <a:chExt cx="0" cy="0"/>
+        </a:xfrm>
+      </p:grpSpPr>
+      <p:sp>
+        <p:nvSpPr>
+          <p:cNvPr id="2" name="Slide Image Placeholder 1"/>
+          <p:cNvSpPr>
+            <a:spLocks noGrp="1" noRot="1" noChangeAspect="1"/>
+          </p:cNvSpPr>
+          <p:nvPr>
+            <p:ph type="sldImg"/>
+          </p:nvPr>
+        </p:nvSpPr>
+        <p:spPr/>
+      </p:sp>
+      <p:sp>
+        <p:nvSpPr>
+          <p:cNvPr id="3" name="Notes Placeholder 2"/>
+          <p:cNvSpPr>
+            <a:spLocks noGrp="1"/>
+          </p:cNvSpPr>
+          <p:nvPr>
+            <p:ph type="body" idx="1"/>
+          </p:nvPr>
+        </p:nvSpPr>
+        <p:spPr/>
+        <p:txBody>
+          <a:bodyPr/>
+          <a:lstStyle/>
+          <a:p>
+            <a:r>
+              <a:rPr lang="en-US" dirty="0" err="1"/>
+              <a:t>finito</a:t>
+            </a:r>
+            <a:endParaRPr lang="en-US" dirty="0"/>
+          </a:p>
+        </p:txBody>
+      </p:sp>
+      <p:sp>
+        <p:nvSpPr>
+          <p:cNvPr id="4" name="Slide Number Placeholder 3"/>
+          <p:cNvSpPr>
+            <a:spLocks noGrp="1"/>
+          </p:cNvSpPr>
+          <p:nvPr>
+            <p:ph type="sldNum" sz="quarter" idx="5"/>
+          </p:nvPr>
+        </p:nvSpPr>
+        <p:spPr/>
+        <p:txBody>
+          <a:bodyPr/>
+          <a:lstStyle/>
+          <a:p>
+            <a:fld id="{93298189-A7EB-4F19-9FED-0CE3B0A96051}" type="slidenum">
+              <a:rPr lang="en-US" smtClean="0"/>
+              <a:t>11</a:t>
+            </a:fld>
+            <a:endParaRPr lang="en-US"/>
+          </a:p>
+        </p:txBody>
+      </p:sp>
+    </p:spTree>
+    <p:extLst>
+      <p:ext uri="{BB962C8B-B14F-4D97-AF65-F5344CB8AC3E}">
+        <p14:creationId xmlns:p14="http://schemas.microsoft.com/office/powerpoint/2010/main" val="2990661288"/>
       </p:ext>
     </p:extLst>
   </p:cSld>
@@ -6462,9 +6637,10 @@
           <a:lstStyle/>
           <a:p>
             <a:r>
-              <a:rPr lang="en-US" dirty="0"/>
-              <a:t>We need to update this</a:t>
+              <a:rPr lang="en-US" dirty="0" err="1"/>
+              <a:t>zarak</a:t>
             </a:r>
+            <a:endParaRPr lang="en-US" dirty="0"/>
           </a:p>
         </p:txBody>
       </p:sp>
@@ -6485,7 +6661,7 @@
           <a:p>
             <a:fld id="{93298189-A7EB-4F19-9FED-0CE3B0A96051}" type="slidenum">
               <a:rPr lang="en-US" smtClean="0"/>
-              <a:t>6</a:t>
+              <a:t>2</a:t>
             </a:fld>
             <a:endParaRPr lang="en-US"/>
           </a:p>
@@ -6494,7 +6670,7 @@
     </p:spTree>
     <p:extLst>
       <p:ext uri="{BB962C8B-B14F-4D97-AF65-F5344CB8AC3E}">
-        <p14:creationId xmlns:p14="http://schemas.microsoft.com/office/powerpoint/2010/main" val="1524742481"/>
+        <p14:creationId xmlns:p14="http://schemas.microsoft.com/office/powerpoint/2010/main" val="2883973476"/>
       </p:ext>
     </p:extLst>
   </p:cSld>
@@ -6548,6 +6724,10 @@
           <a:bodyPr/>
           <a:lstStyle/>
           <a:p>
+            <a:r>
+              <a:rPr lang="en-US" dirty="0" err="1"/>
+              <a:t>zarak</a:t>
+            </a:r>
             <a:endParaRPr lang="en-US" dirty="0"/>
           </a:p>
         </p:txBody>
@@ -6569,7 +6749,7 @@
           <a:p>
             <a:fld id="{93298189-A7EB-4F19-9FED-0CE3B0A96051}" type="slidenum">
               <a:rPr lang="en-US" smtClean="0"/>
-              <a:t>7</a:t>
+              <a:t>3</a:t>
             </a:fld>
             <a:endParaRPr lang="en-US"/>
           </a:p>
@@ -6578,7 +6758,7 @@
     </p:spTree>
     <p:extLst>
       <p:ext uri="{BB962C8B-B14F-4D97-AF65-F5344CB8AC3E}">
-        <p14:creationId xmlns:p14="http://schemas.microsoft.com/office/powerpoint/2010/main" val="4256919419"/>
+        <p14:creationId xmlns:p14="http://schemas.microsoft.com/office/powerpoint/2010/main" val="2279783312"/>
       </p:ext>
     </p:extLst>
   </p:cSld>
@@ -6633,9 +6813,10 @@
           <a:lstStyle/>
           <a:p>
             <a:r>
-              <a:rPr lang="en-US" dirty="0"/>
-              <a:t>The blue box around the window?</a:t>
+              <a:rPr lang="en-US" dirty="0" err="1"/>
+              <a:t>zarak</a:t>
             </a:r>
+            <a:endParaRPr lang="en-US" dirty="0"/>
           </a:p>
         </p:txBody>
       </p:sp>
@@ -6656,7 +6837,7 @@
           <a:p>
             <a:fld id="{93298189-A7EB-4F19-9FED-0CE3B0A96051}" type="slidenum">
               <a:rPr lang="en-US" smtClean="0"/>
-              <a:t>8</a:t>
+              <a:t>4</a:t>
             </a:fld>
             <a:endParaRPr lang="en-US"/>
           </a:p>
@@ -6665,7 +6846,7 @@
     </p:spTree>
     <p:extLst>
       <p:ext uri="{BB962C8B-B14F-4D97-AF65-F5344CB8AC3E}">
-        <p14:creationId xmlns:p14="http://schemas.microsoft.com/office/powerpoint/2010/main" val="2391286375"/>
+        <p14:creationId xmlns:p14="http://schemas.microsoft.com/office/powerpoint/2010/main" val="4224273775"/>
       </p:ext>
     </p:extLst>
   </p:cSld>
@@ -6720,9 +6901,10 @@
           <a:lstStyle/>
           <a:p>
             <a:r>
-              <a:rPr lang="en-US" dirty="0"/>
-              <a:t>Put in both images of results side by side</a:t>
+              <a:rPr lang="en-US" dirty="0" err="1"/>
+              <a:t>zarak</a:t>
             </a:r>
+            <a:endParaRPr lang="en-US" dirty="0"/>
           </a:p>
         </p:txBody>
       </p:sp>
@@ -6743,7 +6925,7 @@
           <a:p>
             <a:fld id="{93298189-A7EB-4F19-9FED-0CE3B0A96051}" type="slidenum">
               <a:rPr lang="en-US" smtClean="0"/>
-              <a:t>9</a:t>
+              <a:t>5</a:t>
             </a:fld>
             <a:endParaRPr lang="en-US"/>
           </a:p>
@@ -6752,7 +6934,7 @@
     </p:spTree>
     <p:extLst>
       <p:ext uri="{BB962C8B-B14F-4D97-AF65-F5344CB8AC3E}">
-        <p14:creationId xmlns:p14="http://schemas.microsoft.com/office/powerpoint/2010/main" val="1881060181"/>
+        <p14:creationId xmlns:p14="http://schemas.microsoft.com/office/powerpoint/2010/main" val="1415195951"/>
       </p:ext>
     </p:extLst>
   </p:cSld>
@@ -6806,7 +6988,10 @@
           <a:bodyPr/>
           <a:lstStyle/>
           <a:p>
-            <a:endParaRPr lang="en-US" dirty="0"/>
+            <a:r>
+              <a:rPr lang="en-US" dirty="0"/>
+              <a:t>pat</a:t>
+            </a:r>
           </a:p>
         </p:txBody>
       </p:sp>
@@ -6827,7 +7012,7 @@
           <a:p>
             <a:fld id="{93298189-A7EB-4F19-9FED-0CE3B0A96051}" type="slidenum">
               <a:rPr lang="en-US" smtClean="0"/>
-              <a:t>10</a:t>
+              <a:t>6</a:t>
             </a:fld>
             <a:endParaRPr lang="en-US"/>
           </a:p>
@@ -6836,7 +7021,268 @@
     </p:spTree>
     <p:extLst>
       <p:ext uri="{BB962C8B-B14F-4D97-AF65-F5344CB8AC3E}">
-        <p14:creationId xmlns:p14="http://schemas.microsoft.com/office/powerpoint/2010/main" val="1915405856"/>
+        <p14:creationId xmlns:p14="http://schemas.microsoft.com/office/powerpoint/2010/main" val="3729487686"/>
+      </p:ext>
+    </p:extLst>
+  </p:cSld>
+  <p:clrMapOvr>
+    <a:masterClrMapping/>
+  </p:clrMapOvr>
+</p:notes>
+</file>
+
+<file path=ppt/notesSlides/notesSlide7.xml><?xml version="1.0" encoding="utf-8"?>
+<p:notes xmlns:a="http://schemas.openxmlformats.org/drawingml/2006/main" xmlns:r="http://schemas.openxmlformats.org/officeDocument/2006/relationships" xmlns:p="http://schemas.openxmlformats.org/presentationml/2006/main">
+  <p:cSld>
+    <p:spTree>
+      <p:nvGrpSpPr>
+        <p:cNvPr id="1" name=""/>
+        <p:cNvGrpSpPr/>
+        <p:nvPr/>
+      </p:nvGrpSpPr>
+      <p:grpSpPr>
+        <a:xfrm>
+          <a:off x="0" y="0"/>
+          <a:ext cx="0" cy="0"/>
+          <a:chOff x="0" y="0"/>
+          <a:chExt cx="0" cy="0"/>
+        </a:xfrm>
+      </p:grpSpPr>
+      <p:sp>
+        <p:nvSpPr>
+          <p:cNvPr id="2" name="Slide Image Placeholder 1"/>
+          <p:cNvSpPr>
+            <a:spLocks noGrp="1" noRot="1" noChangeAspect="1"/>
+          </p:cNvSpPr>
+          <p:nvPr>
+            <p:ph type="sldImg"/>
+          </p:nvPr>
+        </p:nvSpPr>
+        <p:spPr/>
+      </p:sp>
+      <p:sp>
+        <p:nvSpPr>
+          <p:cNvPr id="3" name="Notes Placeholder 2"/>
+          <p:cNvSpPr>
+            <a:spLocks noGrp="1"/>
+          </p:cNvSpPr>
+          <p:nvPr>
+            <p:ph type="body" idx="1"/>
+          </p:nvPr>
+        </p:nvSpPr>
+        <p:spPr/>
+        <p:txBody>
+          <a:bodyPr/>
+          <a:lstStyle/>
+          <a:p>
+            <a:r>
+              <a:rPr lang="en-US" dirty="0"/>
+              <a:t>pat</a:t>
+            </a:r>
+          </a:p>
+        </p:txBody>
+      </p:sp>
+      <p:sp>
+        <p:nvSpPr>
+          <p:cNvPr id="4" name="Slide Number Placeholder 3"/>
+          <p:cNvSpPr>
+            <a:spLocks noGrp="1"/>
+          </p:cNvSpPr>
+          <p:nvPr>
+            <p:ph type="sldNum" sz="quarter" idx="5"/>
+          </p:nvPr>
+        </p:nvSpPr>
+        <p:spPr/>
+        <p:txBody>
+          <a:bodyPr/>
+          <a:lstStyle/>
+          <a:p>
+            <a:fld id="{93298189-A7EB-4F19-9FED-0CE3B0A96051}" type="slidenum">
+              <a:rPr lang="en-US" smtClean="0"/>
+              <a:t>7</a:t>
+            </a:fld>
+            <a:endParaRPr lang="en-US"/>
+          </a:p>
+        </p:txBody>
+      </p:sp>
+    </p:spTree>
+    <p:extLst>
+      <p:ext uri="{BB962C8B-B14F-4D97-AF65-F5344CB8AC3E}">
+        <p14:creationId xmlns:p14="http://schemas.microsoft.com/office/powerpoint/2010/main" val="4256919419"/>
+      </p:ext>
+    </p:extLst>
+  </p:cSld>
+  <p:clrMapOvr>
+    <a:masterClrMapping/>
+  </p:clrMapOvr>
+</p:notes>
+</file>
+
+<file path=ppt/notesSlides/notesSlide8.xml><?xml version="1.0" encoding="utf-8"?>
+<p:notes xmlns:a="http://schemas.openxmlformats.org/drawingml/2006/main" xmlns:r="http://schemas.openxmlformats.org/officeDocument/2006/relationships" xmlns:p="http://schemas.openxmlformats.org/presentationml/2006/main">
+  <p:cSld>
+    <p:spTree>
+      <p:nvGrpSpPr>
+        <p:cNvPr id="1" name=""/>
+        <p:cNvGrpSpPr/>
+        <p:nvPr/>
+      </p:nvGrpSpPr>
+      <p:grpSpPr>
+        <a:xfrm>
+          <a:off x="0" y="0"/>
+          <a:ext cx="0" cy="0"/>
+          <a:chOff x="0" y="0"/>
+          <a:chExt cx="0" cy="0"/>
+        </a:xfrm>
+      </p:grpSpPr>
+      <p:sp>
+        <p:nvSpPr>
+          <p:cNvPr id="2" name="Slide Image Placeholder 1"/>
+          <p:cNvSpPr>
+            <a:spLocks noGrp="1" noRot="1" noChangeAspect="1"/>
+          </p:cNvSpPr>
+          <p:nvPr>
+            <p:ph type="sldImg"/>
+          </p:nvPr>
+        </p:nvSpPr>
+        <p:spPr/>
+      </p:sp>
+      <p:sp>
+        <p:nvSpPr>
+          <p:cNvPr id="3" name="Notes Placeholder 2"/>
+          <p:cNvSpPr>
+            <a:spLocks noGrp="1"/>
+          </p:cNvSpPr>
+          <p:nvPr>
+            <p:ph type="body" idx="1"/>
+          </p:nvPr>
+        </p:nvSpPr>
+        <p:spPr/>
+        <p:txBody>
+          <a:bodyPr/>
+          <a:lstStyle/>
+          <a:p>
+            <a:r>
+              <a:rPr lang="en-US" dirty="0"/>
+              <a:t>pat</a:t>
+            </a:r>
+          </a:p>
+        </p:txBody>
+      </p:sp>
+      <p:sp>
+        <p:nvSpPr>
+          <p:cNvPr id="4" name="Slide Number Placeholder 3"/>
+          <p:cNvSpPr>
+            <a:spLocks noGrp="1"/>
+          </p:cNvSpPr>
+          <p:nvPr>
+            <p:ph type="sldNum" sz="quarter" idx="5"/>
+          </p:nvPr>
+        </p:nvSpPr>
+        <p:spPr/>
+        <p:txBody>
+          <a:bodyPr/>
+          <a:lstStyle/>
+          <a:p>
+            <a:fld id="{93298189-A7EB-4F19-9FED-0CE3B0A96051}" type="slidenum">
+              <a:rPr lang="en-US" smtClean="0"/>
+              <a:t>8</a:t>
+            </a:fld>
+            <a:endParaRPr lang="en-US"/>
+          </a:p>
+        </p:txBody>
+      </p:sp>
+    </p:spTree>
+    <p:extLst>
+      <p:ext uri="{BB962C8B-B14F-4D97-AF65-F5344CB8AC3E}">
+        <p14:creationId xmlns:p14="http://schemas.microsoft.com/office/powerpoint/2010/main" val="2391286375"/>
+      </p:ext>
+    </p:extLst>
+  </p:cSld>
+  <p:clrMapOvr>
+    <a:masterClrMapping/>
+  </p:clrMapOvr>
+</p:notes>
+</file>
+
+<file path=ppt/notesSlides/notesSlide9.xml><?xml version="1.0" encoding="utf-8"?>
+<p:notes xmlns:a="http://schemas.openxmlformats.org/drawingml/2006/main" xmlns:r="http://schemas.openxmlformats.org/officeDocument/2006/relationships" xmlns:p="http://schemas.openxmlformats.org/presentationml/2006/main">
+  <p:cSld>
+    <p:spTree>
+      <p:nvGrpSpPr>
+        <p:cNvPr id="1" name=""/>
+        <p:cNvGrpSpPr/>
+        <p:nvPr/>
+      </p:nvGrpSpPr>
+      <p:grpSpPr>
+        <a:xfrm>
+          <a:off x="0" y="0"/>
+          <a:ext cx="0" cy="0"/>
+          <a:chOff x="0" y="0"/>
+          <a:chExt cx="0" cy="0"/>
+        </a:xfrm>
+      </p:grpSpPr>
+      <p:sp>
+        <p:nvSpPr>
+          <p:cNvPr id="2" name="Slide Image Placeholder 1"/>
+          <p:cNvSpPr>
+            <a:spLocks noGrp="1" noRot="1" noChangeAspect="1"/>
+          </p:cNvSpPr>
+          <p:nvPr>
+            <p:ph type="sldImg"/>
+          </p:nvPr>
+        </p:nvSpPr>
+        <p:spPr/>
+      </p:sp>
+      <p:sp>
+        <p:nvSpPr>
+          <p:cNvPr id="3" name="Notes Placeholder 2"/>
+          <p:cNvSpPr>
+            <a:spLocks noGrp="1"/>
+          </p:cNvSpPr>
+          <p:nvPr>
+            <p:ph type="body" idx="1"/>
+          </p:nvPr>
+        </p:nvSpPr>
+        <p:spPr/>
+        <p:txBody>
+          <a:bodyPr/>
+          <a:lstStyle/>
+          <a:p>
+            <a:r>
+              <a:rPr lang="en-US" dirty="0"/>
+              <a:t>pat</a:t>
+            </a:r>
+          </a:p>
+        </p:txBody>
+      </p:sp>
+      <p:sp>
+        <p:nvSpPr>
+          <p:cNvPr id="4" name="Slide Number Placeholder 3"/>
+          <p:cNvSpPr>
+            <a:spLocks noGrp="1"/>
+          </p:cNvSpPr>
+          <p:nvPr>
+            <p:ph type="sldNum" sz="quarter" idx="5"/>
+          </p:nvPr>
+        </p:nvSpPr>
+        <p:spPr/>
+        <p:txBody>
+          <a:bodyPr/>
+          <a:lstStyle/>
+          <a:p>
+            <a:fld id="{93298189-A7EB-4F19-9FED-0CE3B0A96051}" type="slidenum">
+              <a:rPr lang="en-US" smtClean="0"/>
+              <a:t>9</a:t>
+            </a:fld>
+            <a:endParaRPr lang="en-US"/>
+          </a:p>
+        </p:txBody>
+      </p:sp>
+    </p:spTree>
+    <p:extLst>
+      <p:ext uri="{BB962C8B-B14F-4D97-AF65-F5344CB8AC3E}">
+        <p14:creationId xmlns:p14="http://schemas.microsoft.com/office/powerpoint/2010/main" val="1881060181"/>
       </p:ext>
     </p:extLst>
   </p:cSld>
@@ -7184,7 +7630,7 @@
     </p:spTree>
     <p:extLst>
       <p:ext uri="{BB962C8B-B14F-4D97-AF65-F5344CB8AC3E}">
-        <p14:creationId xmlns:p14="http://schemas.microsoft.com/office/powerpoint/2010/main" val="3063086211"/>
+        <p14:creationId xmlns:p14="http://schemas.microsoft.com/office/powerpoint/2010/main" val="1481950333"/>
       </p:ext>
     </p:extLst>
   </p:cSld>
@@ -7502,7 +7948,7 @@
     </p:spTree>
     <p:extLst>
       <p:ext uri="{BB962C8B-B14F-4D97-AF65-F5344CB8AC3E}">
-        <p14:creationId xmlns:p14="http://schemas.microsoft.com/office/powerpoint/2010/main" val="167113095"/>
+        <p14:creationId xmlns:p14="http://schemas.microsoft.com/office/powerpoint/2010/main" val="1854395797"/>
       </p:ext>
     </p:extLst>
   </p:cSld>
@@ -7990,7 +8436,7 @@
     </p:spTree>
     <p:extLst>
       <p:ext uri="{BB962C8B-B14F-4D97-AF65-F5344CB8AC3E}">
-        <p14:creationId xmlns:p14="http://schemas.microsoft.com/office/powerpoint/2010/main" val="3228113862"/>
+        <p14:creationId xmlns:p14="http://schemas.microsoft.com/office/powerpoint/2010/main" val="2011903340"/>
       </p:ext>
     </p:extLst>
   </p:cSld>
@@ -8359,7 +8805,7 @@
     </p:spTree>
     <p:extLst>
       <p:ext uri="{BB962C8B-B14F-4D97-AF65-F5344CB8AC3E}">
-        <p14:creationId xmlns:p14="http://schemas.microsoft.com/office/powerpoint/2010/main" val="1500880694"/>
+        <p14:creationId xmlns:p14="http://schemas.microsoft.com/office/powerpoint/2010/main" val="3812642095"/>
       </p:ext>
     </p:extLst>
   </p:cSld>
@@ -8632,7 +9078,7 @@
     </p:spTree>
     <p:extLst>
       <p:ext uri="{BB962C8B-B14F-4D97-AF65-F5344CB8AC3E}">
-        <p14:creationId xmlns:p14="http://schemas.microsoft.com/office/powerpoint/2010/main" val="3519495775"/>
+        <p14:creationId xmlns:p14="http://schemas.microsoft.com/office/powerpoint/2010/main" val="300064611"/>
       </p:ext>
     </p:extLst>
   </p:cSld>
@@ -8917,7 +9363,7 @@
     </p:spTree>
     <p:extLst>
       <p:ext uri="{BB962C8B-B14F-4D97-AF65-F5344CB8AC3E}">
-        <p14:creationId xmlns:p14="http://schemas.microsoft.com/office/powerpoint/2010/main" val="3798017663"/>
+        <p14:creationId xmlns:p14="http://schemas.microsoft.com/office/powerpoint/2010/main" val="929252036"/>
       </p:ext>
     </p:extLst>
   </p:cSld>
@@ -9200,7 +9646,7 @@
     </p:spTree>
     <p:extLst>
       <p:ext uri="{BB962C8B-B14F-4D97-AF65-F5344CB8AC3E}">
-        <p14:creationId xmlns:p14="http://schemas.microsoft.com/office/powerpoint/2010/main" val="3675438518"/>
+        <p14:creationId xmlns:p14="http://schemas.microsoft.com/office/powerpoint/2010/main" val="3335196244"/>
       </p:ext>
     </p:extLst>
   </p:cSld>
@@ -9543,7 +9989,7 @@
     </p:spTree>
     <p:extLst>
       <p:ext uri="{BB962C8B-B14F-4D97-AF65-F5344CB8AC3E}">
-        <p14:creationId xmlns:p14="http://schemas.microsoft.com/office/powerpoint/2010/main" val="2722091121"/>
+        <p14:creationId xmlns:p14="http://schemas.microsoft.com/office/powerpoint/2010/main" val="2583964690"/>
       </p:ext>
     </p:extLst>
   </p:cSld>
@@ -9882,7 +10328,7 @@
     </p:spTree>
     <p:extLst>
       <p:ext uri="{BB962C8B-B14F-4D97-AF65-F5344CB8AC3E}">
-        <p14:creationId xmlns:p14="http://schemas.microsoft.com/office/powerpoint/2010/main" val="2704846256"/>
+        <p14:creationId xmlns:p14="http://schemas.microsoft.com/office/powerpoint/2010/main" val="87119255"/>
       </p:ext>
     </p:extLst>
   </p:cSld>
@@ -10359,7 +10805,7 @@
     </p:spTree>
     <p:extLst>
       <p:ext uri="{BB962C8B-B14F-4D97-AF65-F5344CB8AC3E}">
-        <p14:creationId xmlns:p14="http://schemas.microsoft.com/office/powerpoint/2010/main" val="3388492025"/>
+        <p14:creationId xmlns:p14="http://schemas.microsoft.com/office/powerpoint/2010/main" val="2699130570"/>
       </p:ext>
     </p:extLst>
   </p:cSld>
@@ -10580,7 +11026,7 @@
     </p:spTree>
     <p:extLst>
       <p:ext uri="{BB962C8B-B14F-4D97-AF65-F5344CB8AC3E}">
-        <p14:creationId xmlns:p14="http://schemas.microsoft.com/office/powerpoint/2010/main" val="3300087333"/>
+        <p14:creationId xmlns:p14="http://schemas.microsoft.com/office/powerpoint/2010/main" val="2091196087"/>
       </p:ext>
     </p:extLst>
   </p:cSld>
@@ -10675,7 +11121,7 @@
     </p:spTree>
     <p:extLst>
       <p:ext uri="{BB962C8B-B14F-4D97-AF65-F5344CB8AC3E}">
-        <p14:creationId xmlns:p14="http://schemas.microsoft.com/office/powerpoint/2010/main" val="1024138962"/>
+        <p14:creationId xmlns:p14="http://schemas.microsoft.com/office/powerpoint/2010/main" val="85308170"/>
       </p:ext>
     </p:extLst>
   </p:cSld>
@@ -11142,7 +11588,7 @@
     </p:spTree>
     <p:extLst>
       <p:ext uri="{BB962C8B-B14F-4D97-AF65-F5344CB8AC3E}">
-        <p14:creationId xmlns:p14="http://schemas.microsoft.com/office/powerpoint/2010/main" val="1906285883"/>
+        <p14:creationId xmlns:p14="http://schemas.microsoft.com/office/powerpoint/2010/main" val="3583942372"/>
       </p:ext>
     </p:extLst>
   </p:cSld>
@@ -11465,7 +11911,7 @@
     </p:spTree>
     <p:extLst>
       <p:ext uri="{BB962C8B-B14F-4D97-AF65-F5344CB8AC3E}">
-        <p14:creationId xmlns:p14="http://schemas.microsoft.com/office/powerpoint/2010/main" val="3594667776"/>
+        <p14:creationId xmlns:p14="http://schemas.microsoft.com/office/powerpoint/2010/main" val="2103709151"/>
       </p:ext>
     </p:extLst>
   </p:cSld>
@@ -11722,26 +12168,26 @@
     </p:spTree>
     <p:extLst>
       <p:ext uri="{BB962C8B-B14F-4D97-AF65-F5344CB8AC3E}">
-        <p14:creationId xmlns:p14="http://schemas.microsoft.com/office/powerpoint/2010/main" val="3561221244"/>
+        <p14:creationId xmlns:p14="http://schemas.microsoft.com/office/powerpoint/2010/main" val="121551644"/>
       </p:ext>
     </p:extLst>
   </p:cSld>
   <p:clrMap bg1="dk1" tx1="lt1" bg2="dk2" tx2="lt2" accent1="accent1" accent2="accent2" accent3="accent3" accent4="accent4" accent5="accent5" accent6="accent6" hlink="hlink" folHlink="folHlink"/>
   <p:sldLayoutIdLst>
-    <p:sldLayoutId id="2147483661" r:id="rId1"/>
-    <p:sldLayoutId id="2147483662" r:id="rId2"/>
-    <p:sldLayoutId id="2147483663" r:id="rId3"/>
-    <p:sldLayoutId id="2147483664" r:id="rId4"/>
-    <p:sldLayoutId id="2147483665" r:id="rId5"/>
-    <p:sldLayoutId id="2147483666" r:id="rId6"/>
-    <p:sldLayoutId id="2147483667" r:id="rId7"/>
-    <p:sldLayoutId id="2147483668" r:id="rId8"/>
-    <p:sldLayoutId id="2147483669" r:id="rId9"/>
-    <p:sldLayoutId id="2147483670" r:id="rId10"/>
-    <p:sldLayoutId id="2147483671" r:id="rId11"/>
-    <p:sldLayoutId id="2147483672" r:id="rId12"/>
-    <p:sldLayoutId id="2147483673" r:id="rId13"/>
-    <p:sldLayoutId id="2147483674" r:id="rId14"/>
+    <p:sldLayoutId id="2147483676" r:id="rId1"/>
+    <p:sldLayoutId id="2147483677" r:id="rId2"/>
+    <p:sldLayoutId id="2147483678" r:id="rId3"/>
+    <p:sldLayoutId id="2147483679" r:id="rId4"/>
+    <p:sldLayoutId id="2147483680" r:id="rId5"/>
+    <p:sldLayoutId id="2147483681" r:id="rId6"/>
+    <p:sldLayoutId id="2147483682" r:id="rId7"/>
+    <p:sldLayoutId id="2147483683" r:id="rId8"/>
+    <p:sldLayoutId id="2147483684" r:id="rId9"/>
+    <p:sldLayoutId id="2147483685" r:id="rId10"/>
+    <p:sldLayoutId id="2147483686" r:id="rId11"/>
+    <p:sldLayoutId id="2147483687" r:id="rId12"/>
+    <p:sldLayoutId id="2147483688" r:id="rId13"/>
+    <p:sldLayoutId id="2147483689" r:id="rId14"/>
   </p:sldLayoutIdLst>
   <p:txStyles>
     <p:titleStyle>
@@ -12193,7 +12639,7 @@
             </a:r>
             <a:r>
               <a:rPr lang="en-CA" dirty="0">
-                <a:hlinkClick r:id="rId2"/>
+                <a:hlinkClick r:id="rId3"/>
               </a:rPr>
               <a:t>pziajski@myseneca.ca</a:t>
             </a:r>
@@ -12206,7 +12652,7 @@
             </a:r>
             <a:r>
               <a:rPr lang="en-CA" dirty="0">
-                <a:hlinkClick r:id="rId3"/>
+                <a:hlinkClick r:id="rId4"/>
               </a:rPr>
               <a:t>zkhattak@myseneca.ca</a:t>
             </a:r>
@@ -12435,12 +12881,7 @@
             <p:ph type="title"/>
           </p:nvPr>
         </p:nvSpPr>
-        <p:spPr>
-          <a:xfrm>
-            <a:off x="810000" y="447188"/>
-            <a:ext cx="10571998" cy="970450"/>
-          </a:xfrm>
-        </p:spPr>
+        <p:spPr/>
         <p:txBody>
           <a:bodyPr>
             <a:normAutofit/>
@@ -12482,7 +12923,7 @@
         </p:xfrm>
         <a:graphic>
           <a:graphicData uri="http://schemas.openxmlformats.org/drawingml/2006/diagram">
-            <dgm:relIds xmlns:dgm="http://schemas.openxmlformats.org/drawingml/2006/diagram" xmlns:r="http://schemas.openxmlformats.org/officeDocument/2006/relationships" r:dm="rId2" r:lo="rId3" r:qs="rId4" r:cs="rId5"/>
+            <dgm:relIds xmlns:dgm="http://schemas.openxmlformats.org/drawingml/2006/diagram" xmlns:r="http://schemas.openxmlformats.org/officeDocument/2006/relationships" r:dm="rId3" r:lo="rId4" r:qs="rId5" r:cs="rId6"/>
           </a:graphicData>
         </a:graphic>
       </p:graphicFrame>
@@ -12585,13 +13026,19 @@
           <a:p>
             <a:r>
               <a:rPr lang="en-CA" dirty="0"/>
-              <a:t>FLOWCHART</a:t>
+              <a:t>SOFTWARE FLOWCHART</a:t>
             </a:r>
           </a:p>
           <a:p>
             <a:r>
               <a:rPr lang="en-CA" dirty="0"/>
               <a:t>MAJOR COMPONENTS</a:t>
+            </a:r>
+          </a:p>
+          <a:p>
+            <a:r>
+              <a:rPr lang="en-CA" dirty="0"/>
+              <a:t>INFROGRAPHICS</a:t>
             </a:r>
           </a:p>
           <a:p>
@@ -12659,12 +13106,7 @@
             <p:ph type="title"/>
           </p:nvPr>
         </p:nvSpPr>
-        <p:spPr>
-          <a:xfrm>
-            <a:off x="810000" y="447188"/>
-            <a:ext cx="10571998" cy="970450"/>
-          </a:xfrm>
-        </p:spPr>
+        <p:spPr/>
         <p:txBody>
           <a:bodyPr>
             <a:normAutofit/>
@@ -12706,7 +13148,7 @@
         </p:xfrm>
         <a:graphic>
           <a:graphicData uri="http://schemas.openxmlformats.org/drawingml/2006/diagram">
-            <dgm:relIds xmlns:dgm="http://schemas.openxmlformats.org/drawingml/2006/diagram" xmlns:r="http://schemas.openxmlformats.org/officeDocument/2006/relationships" r:dm="rId2" r:lo="rId3" r:qs="rId4" r:cs="rId5"/>
+            <dgm:relIds xmlns:dgm="http://schemas.openxmlformats.org/drawingml/2006/diagram" xmlns:r="http://schemas.openxmlformats.org/officeDocument/2006/relationships" r:dm="rId3" r:lo="rId4" r:qs="rId5" r:cs="rId6"/>
           </a:graphicData>
         </a:graphic>
       </p:graphicFrame>
@@ -12784,7 +13226,12 @@
             <p:ph idx="1"/>
           </p:nvPr>
         </p:nvSpPr>
-        <p:spPr/>
+        <p:spPr>
+          <a:xfrm>
+            <a:off x="818712" y="2222287"/>
+            <a:ext cx="10554574" cy="4118748"/>
+          </a:xfrm>
+        </p:spPr>
         <p:txBody>
           <a:bodyPr/>
           <a:lstStyle/>
@@ -12797,28 +13244,17 @@
           <a:p>
             <a:pPr lvl="1"/>
             <a:r>
-              <a:rPr lang="en-CA" dirty="0">
-                <a:solidFill>
-                  <a:schemeClr val="tx1">
-                    <a:lumMod val="65000"/>
-                  </a:schemeClr>
-                </a:solidFill>
-              </a:rPr>
-              <a:t>Optical Character Recognition (OCR) using Computer vision services (CVS)</a:t>
+              <a:rPr lang="en-US" dirty="0"/>
+              <a:t>Optical Character Recognition (OCR) using Computer Vision Services (CVS)</a:t>
             </a:r>
           </a:p>
           <a:p>
             <a:pPr lvl="1"/>
             <a:r>
-              <a:rPr lang="en-CA" dirty="0">
-                <a:solidFill>
-                  <a:schemeClr val="tx1">
-                    <a:lumMod val="65000"/>
-                  </a:schemeClr>
-                </a:solidFill>
-              </a:rPr>
-              <a:t>Image Digitization using Gaussian Algorithms</a:t>
+              <a:rPr lang="en-US" dirty="0"/>
+              <a:t>Image Digitization</a:t>
             </a:r>
+            <a:endParaRPr lang="en-CA" dirty="0"/>
           </a:p>
           <a:p>
             <a:r>
@@ -12829,40 +13265,36 @@
           <a:p>
             <a:pPr lvl="1"/>
             <a:r>
-              <a:rPr lang="en-CA" dirty="0">
-                <a:solidFill>
-                  <a:schemeClr val="tx1">
-                    <a:lumMod val="65000"/>
-                  </a:schemeClr>
-                </a:solidFill>
-              </a:rPr>
+              <a:rPr lang="en-CA" dirty="0"/>
               <a:t>Raspberry Pi 3 MCU</a:t>
             </a:r>
+            <a:endParaRPr lang="en-CA" b="1" dirty="0"/>
           </a:p>
           <a:p>
             <a:r>
               <a:rPr lang="en-CA" b="1" dirty="0"/>
-              <a:t>Scheduled script execution</a:t>
+              <a:t>Modular execution</a:t>
             </a:r>
           </a:p>
           <a:p>
             <a:pPr lvl="1"/>
             <a:r>
-              <a:rPr lang="en-CA" dirty="0">
-                <a:solidFill>
-                  <a:schemeClr val="tx1">
-                    <a:lumMod val="65000"/>
-                  </a:schemeClr>
-                </a:solidFill>
-              </a:rPr>
-              <a:t>Python script to tie everything together</a:t>
+              <a:rPr lang="en-US" dirty="0"/>
+              <a:t>Manual or Timed Capturing</a:t>
             </a:r>
           </a:p>
           <a:p>
-            <a:pPr marL="0" indent="0">
-              <a:buNone/>
-            </a:pPr>
-            <a:endParaRPr lang="en-CA" dirty="0"/>
+            <a:r>
+              <a:rPr lang="en-US" b="1" dirty="0"/>
+              <a:t>GUI</a:t>
+            </a:r>
+          </a:p>
+          <a:p>
+            <a:pPr lvl="1"/>
+            <a:r>
+              <a:rPr lang="en-US" dirty="0"/>
+              <a:t>User friendly system interaction</a:t>
+            </a:r>
           </a:p>
         </p:txBody>
       </p:sp>
@@ -12906,7 +13338,7 @@
       </p:grpSpPr>
       <p:sp>
         <p:nvSpPr>
-          <p:cNvPr id="33" name="Freeform 6">
+          <p:cNvPr id="17" name="Freeform 6">
             <a:extLst>
               <a:ext uri="{FF2B5EF4-FFF2-40B4-BE49-F238E27FC236}">
                 <a16:creationId xmlns:a16="http://schemas.microsoft.com/office/drawing/2014/main" id="{133F8CB7-795C-4272-9073-64D8CF97F220}"/>
@@ -12999,7 +13431,7 @@
           <a:effectLst/>
           <a:extLst>
             <a:ext uri="{91240B29-F687-4f45-9708-019B960494DF}">
-              <a14:hiddenLine xmlns:a14="http://schemas.microsoft.com/office/drawing/2010/main" xmlns:p14="http://schemas.microsoft.com/office/powerpoint/2010/main" xmlns:a16="http://schemas.microsoft.com/office/drawing/2014/main" xmlns="" w="9525">
+              <a14:hiddenLine xmlns="" xmlns:a16="http://schemas.microsoft.com/office/drawing/2014/main" xmlns:p14="http://schemas.microsoft.com/office/powerpoint/2010/main" xmlns:a14="http://schemas.microsoft.com/office/drawing/2010/main" w="9525">
                 <a:solidFill>
                   <a:srgbClr val="000000"/>
                 </a:solidFill>
@@ -13054,7 +13486,7 @@
           <a:lstStyle/>
           <a:p>
             <a:r>
-              <a:rPr lang="en-US" sz="4600" dirty="0"/>
+              <a:rPr lang="en-US" sz="4600"/>
               <a:t>BLOCK DIAGRAM</a:t>
             </a:r>
           </a:p>
@@ -13062,7 +13494,7 @@
       </p:sp>
       <p:sp>
         <p:nvSpPr>
-          <p:cNvPr id="32" name="Freeform: Shape 31">
+          <p:cNvPr id="19" name="Freeform: Shape 18">
             <a:extLst>
               <a:ext uri="{FF2B5EF4-FFF2-40B4-BE49-F238E27FC236}">
                 <a16:creationId xmlns:a16="http://schemas.microsoft.com/office/drawing/2014/main" id="{9674F1F8-962D-4FF5-B378-D9D2FFDFD27E}"/>
@@ -13290,7 +13722,7 @@
       </p:sp>
       <p:sp>
         <p:nvSpPr>
-          <p:cNvPr id="34" name="Rectangle 33">
+          <p:cNvPr id="21" name="Rectangle 20">
             <a:extLst>
               <a:ext uri="{FF2B5EF4-FFF2-40B4-BE49-F238E27FC236}">
                 <a16:creationId xmlns:a16="http://schemas.microsoft.com/office/drawing/2014/main" id="{C701CDB4-05E2-481A-9165-2455B6FE22A8}"/>
@@ -13353,7 +13785,7 @@
       </p:sp>
       <p:sp>
         <p:nvSpPr>
-          <p:cNvPr id="36" name="Rounded Rectangle 14">
+          <p:cNvPr id="23" name="Rounded Rectangle 14">
             <a:extLst>
               <a:ext uri="{FF2B5EF4-FFF2-40B4-BE49-F238E27FC236}">
                 <a16:creationId xmlns:a16="http://schemas.microsoft.com/office/drawing/2014/main" id="{93C43E0F-EC0A-4928-BA40-42313C09961E}"/>
@@ -13421,32 +13853,28 @@
       </p:sp>
       <p:pic>
         <p:nvPicPr>
-          <p:cNvPr id="9" name="Picture 8">
+          <p:cNvPr id="3" name="Picture 2">
             <a:extLst>
               <a:ext uri="{FF2B5EF4-FFF2-40B4-BE49-F238E27FC236}">
-                <a16:creationId xmlns:a16="http://schemas.microsoft.com/office/drawing/2014/main" id="{09EC1778-ADA3-41BC-94A0-994F5AFE6EF9}"/>
+                <a16:creationId xmlns:a16="http://schemas.microsoft.com/office/drawing/2014/main" id="{90AFDB0B-419B-4A86-98CA-74C1A32C31DF}"/>
               </a:ext>
             </a:extLst>
           </p:cNvPr>
-          <p:cNvPicPr/>
+          <p:cNvPicPr>
+            <a:picLocks noChangeAspect="1"/>
+          </p:cNvPicPr>
           <p:nvPr/>
         </p:nvPicPr>
         <p:blipFill>
-          <a:blip r:embed="rId3">
-            <a:extLst>
-              <a:ext uri="{28A0092B-C50C-407E-A947-70E740481C1C}">
-                <a14:useLocalDpi xmlns:a14="http://schemas.microsoft.com/office/drawing/2010/main" val="0"/>
-              </a:ext>
-            </a:extLst>
-          </a:blip>
+          <a:blip r:embed="rId3"/>
           <a:stretch>
             <a:fillRect/>
           </a:stretch>
         </p:blipFill>
         <p:spPr>
           <a:xfrm>
-            <a:off x="6214684" y="1251276"/>
-            <a:ext cx="4425308" cy="4325739"/>
+            <a:off x="5919664" y="1251276"/>
+            <a:ext cx="5015349" cy="4325739"/>
           </a:xfrm>
           <a:prstGeom prst="rect">
             <a:avLst/>
@@ -13472,7 +13900,7 @@
     <p:bg>
       <p:bgPr>
         <a:solidFill>
-          <a:schemeClr val="bg1"/>
+          <a:schemeClr val="bg2"/>
         </a:solidFill>
         <a:effectLst/>
       </p:bgPr>
@@ -13493,362 +13921,163 @@
       </p:grpSpPr>
       <p:sp>
         <p:nvSpPr>
-          <p:cNvPr id="9" name="Freeform 6">
+          <p:cNvPr id="16" name="Title 1">
             <a:extLst>
               <a:ext uri="{FF2B5EF4-FFF2-40B4-BE49-F238E27FC236}">
-                <a16:creationId xmlns:a16="http://schemas.microsoft.com/office/drawing/2014/main" id="{133F8CB7-795C-4272-9073-64D8CF97F220}"/>
-              </a:ext>
-              <a:ext uri="{C183D7F6-B498-43B3-948B-1728B52AA6E4}">
-                <adec:decorative xmlns:adec="http://schemas.microsoft.com/office/drawing/2017/decorative" val="1"/>
+                <a16:creationId xmlns:a16="http://schemas.microsoft.com/office/drawing/2014/main" id="{68FCBD65-BD08-4FDA-8054-B728F5C9AB75}"/>
               </a:ext>
             </a:extLst>
           </p:cNvPr>
-          <p:cNvSpPr>
-            <a:spLocks noGrp="1" noRot="1" noChangeAspect="1" noMove="1" noResize="1" noEditPoints="1" noAdjustHandles="1" noChangeArrowheads="1" noChangeShapeType="1" noTextEdit="1"/>
+          <p:cNvSpPr txBox="1">
+            <a:spLocks/>
           </p:cNvSpPr>
-          <p:nvPr>
-            <p:extLst>
-              <p:ext uri="{386F3935-93C4-4BCD-93E2-E3B085C9AB24}">
-                <p16:designElem xmlns:p16="http://schemas.microsoft.com/office/powerpoint/2015/main" val="1"/>
-              </p:ext>
-            </p:extLst>
-          </p:nvPr>
-        </p:nvSpPr>
-        <p:spPr bwMode="auto">
-          <a:xfrm>
-            <a:off x="0" y="-3175"/>
-            <a:ext cx="12192000" cy="5203825"/>
-          </a:xfrm>
-          <a:custGeom>
-            <a:avLst/>
-            <a:gdLst/>
-            <a:ahLst/>
-            <a:cxnLst/>
-            <a:rect l="0" t="0" r="r" b="b"/>
-            <a:pathLst>
-              <a:path w="5760" h="3278">
-                <a:moveTo>
-                  <a:pt x="5760" y="0"/>
-                </a:moveTo>
-                <a:lnTo>
-                  <a:pt x="0" y="0"/>
-                </a:lnTo>
-                <a:lnTo>
-                  <a:pt x="0" y="3090"/>
-                </a:lnTo>
-                <a:lnTo>
-                  <a:pt x="943" y="3090"/>
-                </a:lnTo>
-                <a:lnTo>
-                  <a:pt x="1123" y="3270"/>
-                </a:lnTo>
-                <a:lnTo>
-                  <a:pt x="1123" y="3270"/>
-                </a:lnTo>
-                <a:lnTo>
-                  <a:pt x="1127" y="3272"/>
-                </a:lnTo>
-                <a:lnTo>
-                  <a:pt x="1133" y="3275"/>
-                </a:lnTo>
-                <a:lnTo>
-                  <a:pt x="1139" y="3278"/>
-                </a:lnTo>
-                <a:lnTo>
-                  <a:pt x="1144" y="3278"/>
-                </a:lnTo>
-                <a:lnTo>
-                  <a:pt x="1150" y="3278"/>
-                </a:lnTo>
-                <a:lnTo>
-                  <a:pt x="1155" y="3275"/>
-                </a:lnTo>
-                <a:lnTo>
-                  <a:pt x="1161" y="3272"/>
-                </a:lnTo>
-                <a:lnTo>
-                  <a:pt x="1165" y="3270"/>
-                </a:lnTo>
-                <a:lnTo>
-                  <a:pt x="1345" y="3090"/>
-                </a:lnTo>
-                <a:lnTo>
-                  <a:pt x="5760" y="3090"/>
-                </a:lnTo>
-                <a:lnTo>
-                  <a:pt x="5760" y="0"/>
-                </a:lnTo>
-                <a:close/>
-              </a:path>
-            </a:pathLst>
-          </a:custGeom>
-          <a:ln/>
-          <a:effectLst/>
-          <a:extLst>
-            <a:ext uri="{91240B29-F687-4f45-9708-019B960494DF}">
-              <a14:hiddenLine xmlns="" xmlns:a16="http://schemas.microsoft.com/office/drawing/2014/main" xmlns:p14="http://schemas.microsoft.com/office/powerpoint/2010/main" xmlns:a14="http://schemas.microsoft.com/office/drawing/2010/main" w="9525">
-                <a:solidFill>
-                  <a:srgbClr val="000000"/>
-                </a:solidFill>
-                <a:round/>
-                <a:headEnd/>
-                <a:tailEnd/>
-              </a14:hiddenLine>
-            </a:ext>
-          </a:extLst>
-        </p:spPr>
-        <p:style>
-          <a:lnRef idx="1">
-            <a:schemeClr val="accent1"/>
-          </a:lnRef>
-          <a:fillRef idx="3">
-            <a:schemeClr val="accent1"/>
-          </a:fillRef>
-          <a:effectRef idx="2">
-            <a:schemeClr val="accent1"/>
-          </a:effectRef>
-          <a:fontRef idx="minor">
-            <a:schemeClr val="lt1"/>
-          </a:fontRef>
-        </p:style>
-      </p:sp>
-      <p:sp>
-        <p:nvSpPr>
-          <p:cNvPr id="11" name="Rectangle 10">
-            <a:extLst>
-              <a:ext uri="{FF2B5EF4-FFF2-40B4-BE49-F238E27FC236}">
-                <a16:creationId xmlns:a16="http://schemas.microsoft.com/office/drawing/2014/main" id="{180DE8A2-73B1-4AFE-8FB9-BE4B66F39812}"/>
-              </a:ext>
-              <a:ext uri="{C183D7F6-B498-43B3-948B-1728B52AA6E4}">
-                <adec:decorative xmlns:adec="http://schemas.microsoft.com/office/drawing/2017/decorative" val="1"/>
-              </a:ext>
-            </a:extLst>
-          </p:cNvPr>
-          <p:cNvSpPr>
-            <a:spLocks noGrp="1" noRot="1" noChangeAspect="1" noMove="1" noResize="1" noEditPoints="1" noAdjustHandles="1" noChangeArrowheads="1" noChangeShapeType="1" noTextEdit="1"/>
-          </p:cNvSpPr>
-          <p:nvPr>
-            <p:extLst>
-              <p:ext uri="{386F3935-93C4-4BCD-93E2-E3B085C9AB24}">
-                <p16:designElem xmlns:p16="http://schemas.microsoft.com/office/powerpoint/2015/main" val="1"/>
-              </p:ext>
-            </p:extLst>
-          </p:nvPr>
+          <p:nvPr/>
         </p:nvSpPr>
         <p:spPr>
           <a:xfrm>
-            <a:off x="0" y="0"/>
-            <a:ext cx="12192000" cy="6858000"/>
+            <a:off x="1191467" y="5254801"/>
+            <a:ext cx="10571998" cy="970450"/>
           </a:xfrm>
           <a:prstGeom prst="rect">
             <a:avLst/>
           </a:prstGeom>
-          <a:solidFill>
-            <a:schemeClr val="bg1"/>
-          </a:solidFill>
-          <a:ln>
-            <a:noFill/>
-          </a:ln>
+          <a:effectLst>
+            <a:outerShdw blurRad="50800" dir="14400000">
+              <a:srgbClr val="000000">
+                <a:alpha val="60000"/>
+              </a:srgbClr>
+            </a:outerShdw>
+          </a:effectLst>
         </p:spPr>
-        <p:style>
-          <a:lnRef idx="2">
-            <a:schemeClr val="accent1">
-              <a:shade val="50000"/>
-            </a:schemeClr>
-          </a:lnRef>
-          <a:fillRef idx="1">
-            <a:schemeClr val="accent1"/>
-          </a:fillRef>
-          <a:effectRef idx="0">
-            <a:schemeClr val="accent1"/>
-          </a:effectRef>
-          <a:fontRef idx="minor">
-            <a:schemeClr val="lt1"/>
-          </a:fontRef>
-        </p:style>
         <p:txBody>
-          <a:bodyPr rtlCol="0" anchor="ctr"/>
-          <a:lstStyle/>
-          <a:p>
-            <a:pPr algn="ctr"/>
-            <a:endParaRPr lang="en-US"/>
+          <a:bodyPr vert="horz" lIns="91440" tIns="45720" rIns="91440" bIns="45720" rtlCol="0" anchor="b">
+            <a:noAutofit/>
+          </a:bodyPr>
+          <a:lstStyle>
+            <a:lvl1pPr algn="r" defTabSz="457200" rtl="0" eaLnBrk="1" latinLnBrk="0" hangingPunct="1">
+              <a:spcBef>
+                <a:spcPct val="0"/>
+              </a:spcBef>
+              <a:buNone/>
+              <a:defRPr sz="4800" b="1" kern="1200" cap="none">
+                <a:solidFill>
+                  <a:srgbClr val="FEFEFE"/>
+                </a:solidFill>
+                <a:latin typeface="+mj-lt"/>
+                <a:ea typeface="+mj-ea"/>
+                <a:cs typeface="+mj-cs"/>
+              </a:defRPr>
+            </a:lvl1pPr>
+            <a:lvl2pPr eaLnBrk="1" hangingPunct="1">
+              <a:defRPr>
+                <a:solidFill>
+                  <a:schemeClr val="tx2"/>
+                </a:solidFill>
+              </a:defRPr>
+            </a:lvl2pPr>
+            <a:lvl3pPr eaLnBrk="1" hangingPunct="1">
+              <a:defRPr>
+                <a:solidFill>
+                  <a:schemeClr val="tx2"/>
+                </a:solidFill>
+              </a:defRPr>
+            </a:lvl3pPr>
+            <a:lvl4pPr eaLnBrk="1" hangingPunct="1">
+              <a:defRPr>
+                <a:solidFill>
+                  <a:schemeClr val="tx2"/>
+                </a:solidFill>
+              </a:defRPr>
+            </a:lvl4pPr>
+            <a:lvl5pPr eaLnBrk="1" hangingPunct="1">
+              <a:defRPr>
+                <a:solidFill>
+                  <a:schemeClr val="tx2"/>
+                </a:solidFill>
+              </a:defRPr>
+            </a:lvl5pPr>
+            <a:lvl6pPr eaLnBrk="1" hangingPunct="1">
+              <a:defRPr>
+                <a:solidFill>
+                  <a:schemeClr val="tx2"/>
+                </a:solidFill>
+              </a:defRPr>
+            </a:lvl6pPr>
+            <a:lvl7pPr eaLnBrk="1" hangingPunct="1">
+              <a:defRPr>
+                <a:solidFill>
+                  <a:schemeClr val="tx2"/>
+                </a:solidFill>
+              </a:defRPr>
+            </a:lvl7pPr>
+            <a:lvl8pPr eaLnBrk="1" hangingPunct="1">
+              <a:defRPr>
+                <a:solidFill>
+                  <a:schemeClr val="tx2"/>
+                </a:solidFill>
+              </a:defRPr>
+            </a:lvl8pPr>
+            <a:lvl9pPr eaLnBrk="1" hangingPunct="1">
+              <a:defRPr>
+                <a:solidFill>
+                  <a:schemeClr val="tx2"/>
+                </a:solidFill>
+              </a:defRPr>
+            </a:lvl9pPr>
+          </a:lstStyle>
+          <a:p>
+            <a:r>
+              <a:rPr lang="en-CA" dirty="0"/>
+              <a:t>SOFTWARE FLOWCHART</a:t>
+            </a:r>
           </a:p>
         </p:txBody>
       </p:sp>
-      <p:sp>
-        <p:nvSpPr>
-          <p:cNvPr id="13" name="Freeform 6">
+      <p:pic>
+        <p:nvPicPr>
+          <p:cNvPr id="20" name="Picture 19">
             <a:extLst>
               <a:ext uri="{FF2B5EF4-FFF2-40B4-BE49-F238E27FC236}">
-                <a16:creationId xmlns:a16="http://schemas.microsoft.com/office/drawing/2014/main" id="{E5ADB140-E61F-4DA4-A342-F5EF70772D7A}"/>
-              </a:ext>
-              <a:ext uri="{C183D7F6-B498-43B3-948B-1728B52AA6E4}">
-                <adec:decorative xmlns:adec="http://schemas.microsoft.com/office/drawing/2017/decorative" val="1"/>
+                <a16:creationId xmlns:a16="http://schemas.microsoft.com/office/drawing/2014/main" id="{6FF25B53-BEA3-41E7-B605-F4A9A64D20DF}"/>
               </a:ext>
             </a:extLst>
           </p:cNvPr>
-          <p:cNvSpPr>
-            <a:spLocks noGrp="1" noRot="1" noChangeAspect="1" noMove="1" noResize="1" noEditPoints="1" noAdjustHandles="1" noChangeArrowheads="1" noChangeShapeType="1" noTextEdit="1"/>
-          </p:cNvSpPr>
-          <p:nvPr>
-            <p:extLst>
-              <p:ext uri="{386F3935-93C4-4BCD-93E2-E3B085C9AB24}">
-                <p16:designElem xmlns:p16="http://schemas.microsoft.com/office/powerpoint/2015/main" val="1"/>
-              </p:ext>
-            </p:extLst>
-          </p:nvPr>
-        </p:nvSpPr>
-        <p:spPr bwMode="auto">
-          <a:xfrm>
-            <a:off x="0" y="0"/>
-            <a:ext cx="12192000" cy="2185988"/>
-          </a:xfrm>
-          <a:custGeom>
-            <a:avLst/>
-            <a:gdLst/>
-            <a:ahLst/>
-            <a:cxnLst/>
-            <a:rect l="0" t="0" r="r" b="b"/>
-            <a:pathLst>
-              <a:path w="5760" h="1377">
-                <a:moveTo>
-                  <a:pt x="5760" y="0"/>
-                </a:moveTo>
-                <a:lnTo>
-                  <a:pt x="0" y="0"/>
-                </a:lnTo>
-                <a:lnTo>
-                  <a:pt x="0" y="1189"/>
-                </a:lnTo>
-                <a:lnTo>
-                  <a:pt x="943" y="1189"/>
-                </a:lnTo>
-                <a:lnTo>
-                  <a:pt x="1123" y="1369"/>
-                </a:lnTo>
-                <a:lnTo>
-                  <a:pt x="1123" y="1369"/>
-                </a:lnTo>
-                <a:lnTo>
-                  <a:pt x="1127" y="1371"/>
-                </a:lnTo>
-                <a:lnTo>
-                  <a:pt x="1133" y="1374"/>
-                </a:lnTo>
-                <a:lnTo>
-                  <a:pt x="1139" y="1377"/>
-                </a:lnTo>
-                <a:lnTo>
-                  <a:pt x="1144" y="1377"/>
-                </a:lnTo>
-                <a:lnTo>
-                  <a:pt x="1150" y="1377"/>
-                </a:lnTo>
-                <a:lnTo>
-                  <a:pt x="1155" y="1374"/>
-                </a:lnTo>
-                <a:lnTo>
-                  <a:pt x="1161" y="1371"/>
-                </a:lnTo>
-                <a:lnTo>
-                  <a:pt x="1165" y="1369"/>
-                </a:lnTo>
-                <a:lnTo>
-                  <a:pt x="1345" y="1189"/>
-                </a:lnTo>
-                <a:lnTo>
-                  <a:pt x="5760" y="1189"/>
-                </a:lnTo>
-                <a:lnTo>
-                  <a:pt x="5760" y="0"/>
-                </a:lnTo>
-                <a:close/>
-              </a:path>
-            </a:pathLst>
-          </a:custGeom>
-          <a:solidFill>
-            <a:srgbClr val="212121"/>
-          </a:solidFill>
-          <a:ln>
-            <a:noFill/>
-          </a:ln>
-          <a:extLst>
-            <a:ext uri="{91240B29-F687-4f45-9708-019B960494DF}">
-              <a14:hiddenLine xmlns="" xmlns:a16="http://schemas.microsoft.com/office/drawing/2014/main" xmlns:p14="http://schemas.microsoft.com/office/powerpoint/2010/main" xmlns:a14="http://schemas.microsoft.com/office/drawing/2010/main" w="9525">
-                <a:solidFill>
-                  <a:srgbClr val="000000"/>
-                </a:solidFill>
-                <a:round/>
-                <a:headEnd/>
-                <a:tailEnd/>
-              </a14:hiddenLine>
-            </a:ext>
-          </a:extLst>
-        </p:spPr>
-        <p:style>
-          <a:lnRef idx="1">
-            <a:schemeClr val="accent1"/>
-          </a:lnRef>
-          <a:fillRef idx="3">
-            <a:schemeClr val="accent1"/>
-          </a:fillRef>
-          <a:effectRef idx="2">
-            <a:schemeClr val="accent1"/>
-          </a:effectRef>
-          <a:fontRef idx="minor">
-            <a:schemeClr val="lt1"/>
-          </a:fontRef>
-        </p:style>
-      </p:sp>
-      <p:sp>
-        <p:nvSpPr>
-          <p:cNvPr id="2" name="Title 1">
+          <p:cNvPicPr>
+            <a:picLocks noChangeAspect="1"/>
+          </p:cNvPicPr>
+          <p:nvPr/>
+        </p:nvPicPr>
+        <p:blipFill>
+          <a:blip r:embed="rId3">
             <a:extLst>
-              <a:ext uri="{FF2B5EF4-FFF2-40B4-BE49-F238E27FC236}">
-                <a16:creationId xmlns:a16="http://schemas.microsoft.com/office/drawing/2014/main" id="{06FD9A3C-7A48-4702-A67C-B44618B3B889}"/>
+              <a:ext uri="{28A0092B-C50C-407E-A947-70E740481C1C}">
+                <a14:useLocalDpi xmlns:a14="http://schemas.microsoft.com/office/drawing/2010/main" val="0"/>
               </a:ext>
             </a:extLst>
-          </p:cNvPr>
-          <p:cNvSpPr>
-            <a:spLocks noGrp="1"/>
-          </p:cNvSpPr>
-          <p:nvPr>
-            <p:ph type="title"/>
-          </p:nvPr>
-        </p:nvSpPr>
+          </a:blip>
+          <a:stretch>
+            <a:fillRect/>
+          </a:stretch>
+        </p:blipFill>
         <p:spPr>
           <a:xfrm>
-            <a:off x="451514" y="394943"/>
-            <a:ext cx="11288972" cy="816637"/>
+            <a:off x="1903510" y="138550"/>
+            <a:ext cx="8186862" cy="4635403"/>
           </a:xfrm>
-          <a:effectLst/>
+          <a:prstGeom prst="rect">
+            <a:avLst/>
+          </a:prstGeom>
         </p:spPr>
-        <p:txBody>
-          <a:bodyPr vert="horz" lIns="91440" tIns="45720" rIns="91440" bIns="45720" rtlCol="0" anchor="b">
-            <a:normAutofit/>
-          </a:bodyPr>
-          <a:lstStyle/>
-          <a:p>
-            <a:r>
-              <a:rPr lang="en-US" sz="3200">
-                <a:solidFill>
-                  <a:srgbClr val="FFFFFF"/>
-                </a:solidFill>
-              </a:rPr>
-              <a:t>SYSTEM FLOW-CHART</a:t>
-            </a:r>
-          </a:p>
-        </p:txBody>
-      </p:sp>
+      </p:pic>
     </p:spTree>
     <p:extLst>
       <p:ext uri="{BB962C8B-B14F-4D97-AF65-F5344CB8AC3E}">
-        <p14:creationId xmlns:p14="http://schemas.microsoft.com/office/powerpoint/2010/main" val="2472629870"/>
+        <p14:creationId xmlns:p14="http://schemas.microsoft.com/office/powerpoint/2010/main" val="2222030660"/>
       </p:ext>
     </p:extLst>
   </p:cSld>
   <p:clrMapOvr>
-    <a:overrideClrMapping bg1="lt1" tx1="dk1" bg2="lt2" tx2="dk2" accent1="accent1" accent2="accent2" accent3="accent3" accent4="accent4" accent5="accent5" accent6="accent6" hlink="hlink" folHlink="folHlink"/>
+    <a:masterClrMapping/>
   </p:clrMapOvr>
 </p:sld>
 </file>
@@ -14314,7 +14543,7 @@
       </p:grpSpPr>
       <p:sp>
         <p:nvSpPr>
-          <p:cNvPr id="18" name="Freeform 6">
+          <p:cNvPr id="20" name="Freeform 6">
             <a:extLst>
               <a:ext uri="{FF2B5EF4-FFF2-40B4-BE49-F238E27FC236}">
                 <a16:creationId xmlns:a16="http://schemas.microsoft.com/office/drawing/2014/main" id="{133F8CB7-795C-4272-9073-64D8CF97F220}"/>
@@ -14407,7 +14636,7 @@
           <a:effectLst/>
           <a:extLst>
             <a:ext uri="{91240B29-F687-4f45-9708-019B960494DF}">
-              <a14:hiddenLine xmlns:a14="http://schemas.microsoft.com/office/drawing/2010/main" xmlns:p14="http://schemas.microsoft.com/office/powerpoint/2010/main" xmlns:a16="http://schemas.microsoft.com/office/drawing/2014/main" xmlns="" w="9525">
+              <a14:hiddenLine xmlns="" xmlns:a16="http://schemas.microsoft.com/office/drawing/2014/main" xmlns:p14="http://schemas.microsoft.com/office/powerpoint/2010/main" xmlns:a14="http://schemas.microsoft.com/office/drawing/2010/main" w="9525">
                 <a:solidFill>
                   <a:srgbClr val="000000"/>
                 </a:solidFill>
@@ -14435,7 +14664,7 @@
       </p:sp>
       <p:sp>
         <p:nvSpPr>
-          <p:cNvPr id="20" name="Rectangle 19">
+          <p:cNvPr id="22" name="Rectangle 21">
             <a:extLst>
               <a:ext uri="{FF2B5EF4-FFF2-40B4-BE49-F238E27FC236}">
                 <a16:creationId xmlns:a16="http://schemas.microsoft.com/office/drawing/2014/main" id="{B7743172-17A8-4FA4-8434-B813E03B7665}"/>
@@ -14498,7 +14727,7 @@
       </p:sp>
       <p:sp>
         <p:nvSpPr>
-          <p:cNvPr id="22" name="Freeform 23">
+          <p:cNvPr id="24" name="Freeform 23">
             <a:extLst>
               <a:ext uri="{FF2B5EF4-FFF2-40B4-BE49-F238E27FC236}">
                 <a16:creationId xmlns:a16="http://schemas.microsoft.com/office/drawing/2014/main" id="{4CE1233C-FD2F-489E-BFDE-086F5FED6491}"/>
@@ -14721,8 +14950,8 @@
         </p:nvSpPr>
         <p:spPr>
           <a:xfrm>
-            <a:off x="314107" y="1800225"/>
-            <a:ext cx="3762302" cy="2276184"/>
+            <a:off x="451514" y="1800225"/>
+            <a:ext cx="3444211" cy="4241136"/>
           </a:xfrm>
         </p:spPr>
         <p:txBody>
@@ -14760,8 +14989,8 @@
         </p:blipFill>
         <p:spPr>
           <a:xfrm>
-            <a:off x="5402112" y="631261"/>
-            <a:ext cx="6011222" cy="5410101"/>
+            <a:off x="5415672" y="643465"/>
+            <a:ext cx="5997662" cy="5397897"/>
           </a:xfrm>
           <a:prstGeom prst="roundRect">
             <a:avLst>
@@ -14771,9 +15000,7 @@
           <a:ln>
             <a:noFill/>
           </a:ln>
-          <a:effectLst>
-            <a:softEdge rad="0"/>
-          </a:effectLst>
+          <a:effectLst/>
         </p:spPr>
       </p:pic>
     </p:spTree>
@@ -14842,6 +15069,290 @@
                 </a:solidFill>
               </a:rPr>
               <a:t>Example Results</a:t>
+            </a:r>
+          </a:p>
+        </p:txBody>
+      </p:sp>
+      <p:pic>
+        <p:nvPicPr>
+          <p:cNvPr id="5" name="Picture 4">
+            <a:extLst>
+              <a:ext uri="{FF2B5EF4-FFF2-40B4-BE49-F238E27FC236}">
+                <a16:creationId xmlns:a16="http://schemas.microsoft.com/office/drawing/2014/main" id="{AF6A4507-E564-4EA1-881D-9E7A85728769}"/>
+              </a:ext>
+            </a:extLst>
+          </p:cNvPr>
+          <p:cNvPicPr>
+            <a:picLocks noChangeAspect="1"/>
+          </p:cNvPicPr>
+          <p:nvPr/>
+        </p:nvPicPr>
+        <p:blipFill>
+          <a:blip r:embed="rId3"/>
+          <a:stretch>
+            <a:fillRect/>
+          </a:stretch>
+        </p:blipFill>
+        <p:spPr>
+          <a:xfrm>
+            <a:off x="572389" y="2347789"/>
+            <a:ext cx="5107973" cy="4022529"/>
+          </a:xfrm>
+          <a:prstGeom prst="rect">
+            <a:avLst/>
+          </a:prstGeom>
+        </p:spPr>
+      </p:pic>
+      <p:pic>
+        <p:nvPicPr>
+          <p:cNvPr id="6" name="Picture 5">
+            <a:extLst>
+              <a:ext uri="{FF2B5EF4-FFF2-40B4-BE49-F238E27FC236}">
+                <a16:creationId xmlns:a16="http://schemas.microsoft.com/office/drawing/2014/main" id="{E54A1168-BA07-4E66-AE29-8D9305EF65BF}"/>
+              </a:ext>
+            </a:extLst>
+          </p:cNvPr>
+          <p:cNvPicPr>
+            <a:picLocks noChangeAspect="1"/>
+          </p:cNvPicPr>
+          <p:nvPr/>
+        </p:nvPicPr>
+        <p:blipFill>
+          <a:blip r:embed="rId4"/>
+          <a:stretch>
+            <a:fillRect/>
+          </a:stretch>
+        </p:blipFill>
+        <p:spPr>
+          <a:xfrm>
+            <a:off x="6511638" y="2347789"/>
+            <a:ext cx="5107973" cy="4022529"/>
+          </a:xfrm>
+          <a:prstGeom prst="rect">
+            <a:avLst/>
+          </a:prstGeom>
+        </p:spPr>
+      </p:pic>
+      <p:sp>
+        <p:nvSpPr>
+          <p:cNvPr id="22" name="Title 1">
+            <a:extLst>
+              <a:ext uri="{FF2B5EF4-FFF2-40B4-BE49-F238E27FC236}">
+                <a16:creationId xmlns:a16="http://schemas.microsoft.com/office/drawing/2014/main" id="{2482CDE7-09DA-468E-BCB8-30815D0308CA}"/>
+              </a:ext>
+            </a:extLst>
+          </p:cNvPr>
+          <p:cNvSpPr txBox="1">
+            <a:spLocks/>
+          </p:cNvSpPr>
+          <p:nvPr/>
+        </p:nvSpPr>
+        <p:spPr>
+          <a:xfrm>
+            <a:off x="1872990" y="6370318"/>
+            <a:ext cx="2288915" cy="388620"/>
+          </a:xfrm>
+          <a:prstGeom prst="rect">
+            <a:avLst/>
+          </a:prstGeom>
+          <a:effectLst/>
+        </p:spPr>
+        <p:txBody>
+          <a:bodyPr vert="horz" lIns="91440" tIns="45720" rIns="91440" bIns="45720" rtlCol="0" anchor="b">
+            <a:normAutofit lnSpcReduction="10000"/>
+          </a:bodyPr>
+          <a:lstStyle>
+            <a:lvl1pPr algn="l" defTabSz="457200" rtl="0" eaLnBrk="1" latinLnBrk="0" hangingPunct="1">
+              <a:spcBef>
+                <a:spcPct val="0"/>
+              </a:spcBef>
+              <a:buNone/>
+              <a:defRPr sz="4000" b="1" kern="1200">
+                <a:solidFill>
+                  <a:srgbClr val="FEFEFE"/>
+                </a:solidFill>
+                <a:latin typeface="+mj-lt"/>
+                <a:ea typeface="+mj-ea"/>
+                <a:cs typeface="+mj-cs"/>
+              </a:defRPr>
+            </a:lvl1pPr>
+            <a:lvl2pPr eaLnBrk="1" hangingPunct="1">
+              <a:defRPr>
+                <a:solidFill>
+                  <a:schemeClr val="tx2"/>
+                </a:solidFill>
+              </a:defRPr>
+            </a:lvl2pPr>
+            <a:lvl3pPr eaLnBrk="1" hangingPunct="1">
+              <a:defRPr>
+                <a:solidFill>
+                  <a:schemeClr val="tx2"/>
+                </a:solidFill>
+              </a:defRPr>
+            </a:lvl3pPr>
+            <a:lvl4pPr eaLnBrk="1" hangingPunct="1">
+              <a:defRPr>
+                <a:solidFill>
+                  <a:schemeClr val="tx2"/>
+                </a:solidFill>
+              </a:defRPr>
+            </a:lvl4pPr>
+            <a:lvl5pPr eaLnBrk="1" hangingPunct="1">
+              <a:defRPr>
+                <a:solidFill>
+                  <a:schemeClr val="tx2"/>
+                </a:solidFill>
+              </a:defRPr>
+            </a:lvl5pPr>
+            <a:lvl6pPr eaLnBrk="1" hangingPunct="1">
+              <a:defRPr>
+                <a:solidFill>
+                  <a:schemeClr val="tx2"/>
+                </a:solidFill>
+              </a:defRPr>
+            </a:lvl6pPr>
+            <a:lvl7pPr eaLnBrk="1" hangingPunct="1">
+              <a:defRPr>
+                <a:solidFill>
+                  <a:schemeClr val="tx2"/>
+                </a:solidFill>
+              </a:defRPr>
+            </a:lvl7pPr>
+            <a:lvl8pPr eaLnBrk="1" hangingPunct="1">
+              <a:defRPr>
+                <a:solidFill>
+                  <a:schemeClr val="tx2"/>
+                </a:solidFill>
+              </a:defRPr>
+            </a:lvl8pPr>
+            <a:lvl9pPr eaLnBrk="1" hangingPunct="1">
+              <a:defRPr>
+                <a:solidFill>
+                  <a:schemeClr val="tx2"/>
+                </a:solidFill>
+              </a:defRPr>
+            </a:lvl9pPr>
+          </a:lstStyle>
+          <a:p>
+            <a:r>
+              <a:rPr lang="en-US" sz="2000" dirty="0">
+                <a:solidFill>
+                  <a:srgbClr val="FFFFFF"/>
+                </a:solidFill>
+              </a:rPr>
+              <a:t>Validated Result</a:t>
+            </a:r>
+          </a:p>
+        </p:txBody>
+      </p:sp>
+      <p:sp>
+        <p:nvSpPr>
+          <p:cNvPr id="24" name="Title 1">
+            <a:extLst>
+              <a:ext uri="{FF2B5EF4-FFF2-40B4-BE49-F238E27FC236}">
+                <a16:creationId xmlns:a16="http://schemas.microsoft.com/office/drawing/2014/main" id="{4595A6F7-FFFB-41D8-BCEB-30056D8314C4}"/>
+              </a:ext>
+            </a:extLst>
+          </p:cNvPr>
+          <p:cNvSpPr txBox="1">
+            <a:spLocks/>
+          </p:cNvSpPr>
+          <p:nvPr/>
+        </p:nvSpPr>
+        <p:spPr>
+          <a:xfrm>
+            <a:off x="7620163" y="6370318"/>
+            <a:ext cx="2890921" cy="388620"/>
+          </a:xfrm>
+          <a:prstGeom prst="rect">
+            <a:avLst/>
+          </a:prstGeom>
+          <a:effectLst/>
+        </p:spPr>
+        <p:txBody>
+          <a:bodyPr vert="horz" lIns="91440" tIns="45720" rIns="91440" bIns="45720" rtlCol="0" anchor="b">
+            <a:normAutofit lnSpcReduction="10000"/>
+          </a:bodyPr>
+          <a:lstStyle>
+            <a:lvl1pPr algn="l" defTabSz="457200" rtl="0" eaLnBrk="1" latinLnBrk="0" hangingPunct="1">
+              <a:spcBef>
+                <a:spcPct val="0"/>
+              </a:spcBef>
+              <a:buNone/>
+              <a:defRPr sz="4000" b="1" kern="1200">
+                <a:solidFill>
+                  <a:srgbClr val="FEFEFE"/>
+                </a:solidFill>
+                <a:latin typeface="+mj-lt"/>
+                <a:ea typeface="+mj-ea"/>
+                <a:cs typeface="+mj-cs"/>
+              </a:defRPr>
+            </a:lvl1pPr>
+            <a:lvl2pPr eaLnBrk="1" hangingPunct="1">
+              <a:defRPr>
+                <a:solidFill>
+                  <a:schemeClr val="tx2"/>
+                </a:solidFill>
+              </a:defRPr>
+            </a:lvl2pPr>
+            <a:lvl3pPr eaLnBrk="1" hangingPunct="1">
+              <a:defRPr>
+                <a:solidFill>
+                  <a:schemeClr val="tx2"/>
+                </a:solidFill>
+              </a:defRPr>
+            </a:lvl3pPr>
+            <a:lvl4pPr eaLnBrk="1" hangingPunct="1">
+              <a:defRPr>
+                <a:solidFill>
+                  <a:schemeClr val="tx2"/>
+                </a:solidFill>
+              </a:defRPr>
+            </a:lvl4pPr>
+            <a:lvl5pPr eaLnBrk="1" hangingPunct="1">
+              <a:defRPr>
+                <a:solidFill>
+                  <a:schemeClr val="tx2"/>
+                </a:solidFill>
+              </a:defRPr>
+            </a:lvl5pPr>
+            <a:lvl6pPr eaLnBrk="1" hangingPunct="1">
+              <a:defRPr>
+                <a:solidFill>
+                  <a:schemeClr val="tx2"/>
+                </a:solidFill>
+              </a:defRPr>
+            </a:lvl6pPr>
+            <a:lvl7pPr eaLnBrk="1" hangingPunct="1">
+              <a:defRPr>
+                <a:solidFill>
+                  <a:schemeClr val="tx2"/>
+                </a:solidFill>
+              </a:defRPr>
+            </a:lvl7pPr>
+            <a:lvl8pPr eaLnBrk="1" hangingPunct="1">
+              <a:defRPr>
+                <a:solidFill>
+                  <a:schemeClr val="tx2"/>
+                </a:solidFill>
+              </a:defRPr>
+            </a:lvl8pPr>
+            <a:lvl9pPr eaLnBrk="1" hangingPunct="1">
+              <a:defRPr>
+                <a:solidFill>
+                  <a:schemeClr val="tx2"/>
+                </a:solidFill>
+              </a:defRPr>
+            </a:lvl9pPr>
+          </a:lstStyle>
+          <a:p>
+            <a:r>
+              <a:rPr lang="en-US" sz="2000" dirty="0">
+                <a:solidFill>
+                  <a:srgbClr val="FFFFFF"/>
+                </a:solidFill>
+              </a:rPr>
+              <a:t>Non-Validated Result</a:t>
             </a:r>
           </a:p>
         </p:txBody>

</xml_diff>